<commit_message>
Analysis and Presentation vs2
</commit_message>
<xml_diff>
--- a/Presentation/GitHub Project Presentation.pptx
+++ b/Presentation/GitHub Project Presentation.pptx
@@ -9,15 +9,21 @@
     <p:sldId id="259" r:id="rId3"/>
     <p:sldId id="257" r:id="rId4"/>
     <p:sldId id="258" r:id="rId5"/>
-    <p:sldId id="260" r:id="rId6"/>
-    <p:sldId id="261" r:id="rId7"/>
-    <p:sldId id="263" r:id="rId8"/>
-    <p:sldId id="264" r:id="rId9"/>
-    <p:sldId id="265" r:id="rId10"/>
-    <p:sldId id="266" r:id="rId11"/>
-    <p:sldId id="267" r:id="rId12"/>
-    <p:sldId id="268" r:id="rId13"/>
-    <p:sldId id="262" r:id="rId14"/>
+    <p:sldId id="273" r:id="rId6"/>
+    <p:sldId id="260" r:id="rId7"/>
+    <p:sldId id="261" r:id="rId8"/>
+    <p:sldId id="263" r:id="rId9"/>
+    <p:sldId id="264" r:id="rId10"/>
+    <p:sldId id="262" r:id="rId11"/>
+    <p:sldId id="274" r:id="rId12"/>
+    <p:sldId id="265" r:id="rId13"/>
+    <p:sldId id="270" r:id="rId14"/>
+    <p:sldId id="266" r:id="rId15"/>
+    <p:sldId id="271" r:id="rId16"/>
+    <p:sldId id="275" r:id="rId17"/>
+    <p:sldId id="267" r:id="rId18"/>
+    <p:sldId id="268" r:id="rId19"/>
+    <p:sldId id="272" r:id="rId20"/>
   </p:sldIdLst>
   <p:sldSz cx="12192000" cy="6858000"/>
   <p:notesSz cx="6858000" cy="9144000"/>
@@ -6194,6 +6200,528 @@
           <p:cNvPr id="2" name="Title 1">
             <a:extLst>
               <a:ext uri="{FF2B5EF4-FFF2-40B4-BE49-F238E27FC236}">
+                <a16:creationId xmlns:a16="http://schemas.microsoft.com/office/drawing/2014/main" id="{FA046525-605C-93CE-FFF8-46B81114FE12}"/>
+              </a:ext>
+            </a:extLst>
+          </p:cNvPr>
+          <p:cNvSpPr>
+            <a:spLocks noGrp="1"/>
+          </p:cNvSpPr>
+          <p:nvPr>
+            <p:ph type="title"/>
+          </p:nvPr>
+        </p:nvSpPr>
+        <p:spPr/>
+        <p:txBody>
+          <a:bodyPr/>
+          <a:lstStyle/>
+          <a:p>
+            <a:r>
+              <a:rPr lang="en-US" dirty="0"/>
+              <a:t>Data Analysis Outcomes</a:t>
+            </a:r>
+            <a:br>
+              <a:rPr lang="en-US" dirty="0"/>
+            </a:br>
+            <a:r>
+              <a:rPr lang="en-US" sz="3200" kern="100" dirty="0">
+                <a:effectLst/>
+                <a:latin typeface="Calibri" panose="020F0502020204030204" pitchFamily="34" charset="0"/>
+                <a:ea typeface="Calibri" panose="020F0502020204030204" pitchFamily="34" charset="0"/>
+                <a:cs typeface="Times New Roman" panose="02020603050405020304" pitchFamily="18" charset="0"/>
+              </a:rPr>
+              <a:t>Cancellation</a:t>
+            </a:r>
+            <a:r>
+              <a:rPr lang="en-US" sz="2800" kern="100" dirty="0">
+                <a:effectLst/>
+                <a:latin typeface="Calibri" panose="020F0502020204030204" pitchFamily="34" charset="0"/>
+                <a:ea typeface="Calibri" panose="020F0502020204030204" pitchFamily="34" charset="0"/>
+                <a:cs typeface="Times New Roman" panose="02020603050405020304" pitchFamily="18" charset="0"/>
+              </a:rPr>
+              <a:t> </a:t>
+            </a:r>
+            <a:r>
+              <a:rPr lang="en-US" sz="3200" kern="100" dirty="0">
+                <a:effectLst/>
+                <a:latin typeface="Calibri" panose="020F0502020204030204" pitchFamily="34" charset="0"/>
+                <a:ea typeface="Calibri" panose="020F0502020204030204" pitchFamily="34" charset="0"/>
+                <a:cs typeface="Times New Roman" panose="02020603050405020304" pitchFamily="18" charset="0"/>
+              </a:rPr>
+              <a:t>of</a:t>
+            </a:r>
+            <a:r>
+              <a:rPr lang="en-US" sz="2800" kern="100" dirty="0">
+                <a:effectLst/>
+                <a:latin typeface="Calibri" panose="020F0502020204030204" pitchFamily="34" charset="0"/>
+                <a:ea typeface="Calibri" panose="020F0502020204030204" pitchFamily="34" charset="0"/>
+                <a:cs typeface="Times New Roman" panose="02020603050405020304" pitchFamily="18" charset="0"/>
+              </a:rPr>
+              <a:t> </a:t>
+            </a:r>
+            <a:r>
+              <a:rPr lang="en-US" sz="3200" kern="100" dirty="0">
+                <a:effectLst/>
+                <a:latin typeface="Calibri" panose="020F0502020204030204" pitchFamily="34" charset="0"/>
+                <a:ea typeface="Calibri" panose="020F0502020204030204" pitchFamily="34" charset="0"/>
+                <a:cs typeface="Times New Roman" panose="02020603050405020304" pitchFamily="18" charset="0"/>
+              </a:rPr>
+              <a:t>Reservations</a:t>
+            </a:r>
+            <a:br>
+              <a:rPr lang="en-US" dirty="0"/>
+            </a:br>
+            <a:endParaRPr lang="en-US" dirty="0"/>
+          </a:p>
+        </p:txBody>
+      </p:sp>
+      <p:sp>
+        <p:nvSpPr>
+          <p:cNvPr id="3" name="Content Placeholder 2">
+            <a:extLst>
+              <a:ext uri="{FF2B5EF4-FFF2-40B4-BE49-F238E27FC236}">
+                <a16:creationId xmlns:a16="http://schemas.microsoft.com/office/drawing/2014/main" id="{D753B325-C879-4089-E5E6-4277E190B39D}"/>
+              </a:ext>
+            </a:extLst>
+          </p:cNvPr>
+          <p:cNvSpPr>
+            <a:spLocks noGrp="1"/>
+          </p:cNvSpPr>
+          <p:nvPr>
+            <p:ph idx="1"/>
+          </p:nvPr>
+        </p:nvSpPr>
+        <p:spPr>
+          <a:xfrm>
+            <a:off x="735178" y="1853248"/>
+            <a:ext cx="8946541" cy="2657911"/>
+          </a:xfrm>
+        </p:spPr>
+        <p:txBody>
+          <a:bodyPr>
+            <a:normAutofit/>
+          </a:bodyPr>
+          <a:lstStyle/>
+          <a:p>
+            <a:r>
+              <a:rPr lang="en-US" sz="2400" kern="100" dirty="0">
+                <a:latin typeface="Calibri" panose="020F0502020204030204" pitchFamily="34" charset="0"/>
+                <a:ea typeface="Calibri" panose="020F0502020204030204" pitchFamily="34" charset="0"/>
+                <a:cs typeface="Times New Roman" panose="02020603050405020304" pitchFamily="18" charset="0"/>
+              </a:rPr>
+              <a:t>Countries with lower cancellation percentage are GBR, IRL, BEL, IRL</a:t>
+            </a:r>
+          </a:p>
+          <a:p>
+            <a:r>
+              <a:rPr lang="en-US" sz="2400" kern="100" dirty="0">
+                <a:effectLst/>
+                <a:latin typeface="Calibri" panose="020F0502020204030204" pitchFamily="34" charset="0"/>
+                <a:ea typeface="Calibri" panose="020F0502020204030204" pitchFamily="34" charset="0"/>
+                <a:cs typeface="Times New Roman" panose="02020603050405020304" pitchFamily="18" charset="0"/>
+              </a:rPr>
+              <a:t>Cancellation percentage is higher </a:t>
+            </a:r>
+            <a:r>
+              <a:rPr lang="en-US" sz="2400" kern="100" dirty="0">
+                <a:latin typeface="Calibri" panose="020F0502020204030204" pitchFamily="34" charset="0"/>
+                <a:ea typeface="Calibri" panose="020F0502020204030204" pitchFamily="34" charset="0"/>
+                <a:cs typeface="Times New Roman" panose="02020603050405020304" pitchFamily="18" charset="0"/>
+              </a:rPr>
+              <a:t>for Online TA and Groups</a:t>
+            </a:r>
+          </a:p>
+          <a:p>
+            <a:r>
+              <a:rPr lang="en-US" sz="2400" kern="100" dirty="0">
+                <a:effectLst/>
+                <a:latin typeface="Calibri" panose="020F0502020204030204" pitchFamily="34" charset="0"/>
+                <a:ea typeface="Calibri" panose="020F0502020204030204" pitchFamily="34" charset="0"/>
+                <a:cs typeface="Times New Roman" panose="02020603050405020304" pitchFamily="18" charset="0"/>
+              </a:rPr>
+              <a:t>Resort Hotels have lower cancellation rate vs City Hotels</a:t>
+            </a:r>
+          </a:p>
+          <a:p>
+            <a:r>
+              <a:rPr lang="en-US" sz="2400" kern="100" dirty="0">
+                <a:effectLst/>
+                <a:latin typeface="Calibri" panose="020F0502020204030204" pitchFamily="34" charset="0"/>
+                <a:ea typeface="Calibri" panose="020F0502020204030204" pitchFamily="34" charset="0"/>
+                <a:cs typeface="Times New Roman" panose="02020603050405020304" pitchFamily="18" charset="0"/>
+              </a:rPr>
+              <a:t>For lead time over 50 days, cancellation chances are higher</a:t>
+            </a:r>
+          </a:p>
+          <a:p>
+            <a:endParaRPr lang="en-US" dirty="0"/>
+          </a:p>
+        </p:txBody>
+      </p:sp>
+    </p:spTree>
+    <p:extLst>
+      <p:ext uri="{BB962C8B-B14F-4D97-AF65-F5344CB8AC3E}">
+        <p14:creationId xmlns:p14="http://schemas.microsoft.com/office/powerpoint/2010/main" val="3597321058"/>
+      </p:ext>
+    </p:extLst>
+  </p:cSld>
+  <p:clrMapOvr>
+    <a:masterClrMapping/>
+  </p:clrMapOvr>
+</p:sld>
+</file>
+
+<file path=ppt/slides/slide11.xml><?xml version="1.0" encoding="utf-8"?>
+<p:sld xmlns:a="http://schemas.openxmlformats.org/drawingml/2006/main" xmlns:r="http://schemas.openxmlformats.org/officeDocument/2006/relationships" xmlns:p="http://schemas.openxmlformats.org/presentationml/2006/main">
+  <p:cSld>
+    <p:spTree>
+      <p:nvGrpSpPr>
+        <p:cNvPr id="1" name=""/>
+        <p:cNvGrpSpPr/>
+        <p:nvPr/>
+      </p:nvGrpSpPr>
+      <p:grpSpPr>
+        <a:xfrm>
+          <a:off x="0" y="0"/>
+          <a:ext cx="0" cy="0"/>
+          <a:chOff x="0" y="0"/>
+          <a:chExt cx="0" cy="0"/>
+        </a:xfrm>
+      </p:grpSpPr>
+      <p:sp>
+        <p:nvSpPr>
+          <p:cNvPr id="2" name="Title 1">
+            <a:extLst>
+              <a:ext uri="{FF2B5EF4-FFF2-40B4-BE49-F238E27FC236}">
+                <a16:creationId xmlns:a16="http://schemas.microsoft.com/office/drawing/2014/main" id="{DC1D68CF-A6F6-E5B3-B472-9AA82104696A}"/>
+              </a:ext>
+            </a:extLst>
+          </p:cNvPr>
+          <p:cNvSpPr>
+            <a:spLocks noGrp="1"/>
+          </p:cNvSpPr>
+          <p:nvPr>
+            <p:ph type="ctrTitle"/>
+          </p:nvPr>
+        </p:nvSpPr>
+        <p:spPr>
+          <a:xfrm>
+            <a:off x="257333" y="189452"/>
+            <a:ext cx="8825658" cy="3329581"/>
+          </a:xfrm>
+        </p:spPr>
+        <p:txBody>
+          <a:bodyPr/>
+          <a:lstStyle/>
+          <a:p>
+            <a:r>
+              <a:rPr lang="en-US" sz="6000" dirty="0"/>
+              <a:t>Price Analysis</a:t>
+            </a:r>
+          </a:p>
+        </p:txBody>
+      </p:sp>
+    </p:spTree>
+    <p:extLst>
+      <p:ext uri="{BB962C8B-B14F-4D97-AF65-F5344CB8AC3E}">
+        <p14:creationId xmlns:p14="http://schemas.microsoft.com/office/powerpoint/2010/main" val="4115037819"/>
+      </p:ext>
+    </p:extLst>
+  </p:cSld>
+  <p:clrMapOvr>
+    <a:masterClrMapping/>
+  </p:clrMapOvr>
+</p:sld>
+</file>
+
+<file path=ppt/slides/slide12.xml><?xml version="1.0" encoding="utf-8"?>
+<p:sld xmlns:a="http://schemas.openxmlformats.org/drawingml/2006/main" xmlns:r="http://schemas.openxmlformats.org/officeDocument/2006/relationships" xmlns:p="http://schemas.openxmlformats.org/presentationml/2006/main">
+  <p:cSld>
+    <p:spTree>
+      <p:nvGrpSpPr>
+        <p:cNvPr id="1" name=""/>
+        <p:cNvGrpSpPr/>
+        <p:nvPr/>
+      </p:nvGrpSpPr>
+      <p:grpSpPr>
+        <a:xfrm>
+          <a:off x="0" y="0"/>
+          <a:ext cx="0" cy="0"/>
+          <a:chOff x="0" y="0"/>
+          <a:chExt cx="0" cy="0"/>
+        </a:xfrm>
+      </p:grpSpPr>
+      <p:sp>
+        <p:nvSpPr>
+          <p:cNvPr id="2" name="Title 1">
+            <a:extLst>
+              <a:ext uri="{FF2B5EF4-FFF2-40B4-BE49-F238E27FC236}">
+                <a16:creationId xmlns:a16="http://schemas.microsoft.com/office/drawing/2014/main" id="{77B9CE2C-5798-329F-454E-1E9DD5FEE246}"/>
+              </a:ext>
+            </a:extLst>
+          </p:cNvPr>
+          <p:cNvSpPr>
+            <a:spLocks noGrp="1"/>
+          </p:cNvSpPr>
+          <p:nvPr>
+            <p:ph type="title"/>
+          </p:nvPr>
+        </p:nvSpPr>
+        <p:spPr/>
+        <p:txBody>
+          <a:bodyPr/>
+          <a:lstStyle/>
+          <a:p>
+            <a:r>
+              <a:rPr lang="en-US" kern="100" dirty="0">
+                <a:effectLst/>
+                <a:latin typeface="Calibri" panose="020F0502020204030204" pitchFamily="34" charset="0"/>
+                <a:ea typeface="Calibri" panose="020F0502020204030204" pitchFamily="34" charset="0"/>
+                <a:cs typeface="Times New Roman" panose="02020603050405020304" pitchFamily="18" charset="0"/>
+              </a:rPr>
+              <a:t>Price</a:t>
+            </a:r>
+            <a:r>
+              <a:rPr lang="en-US" sz="4000" kern="100" dirty="0">
+                <a:effectLst/>
+                <a:latin typeface="Calibri" panose="020F0502020204030204" pitchFamily="34" charset="0"/>
+                <a:ea typeface="Calibri" panose="020F0502020204030204" pitchFamily="34" charset="0"/>
+                <a:cs typeface="Times New Roman" panose="02020603050405020304" pitchFamily="18" charset="0"/>
+              </a:rPr>
+              <a:t> </a:t>
+            </a:r>
+            <a:r>
+              <a:rPr lang="en-US" kern="100" dirty="0">
+                <a:effectLst/>
+                <a:latin typeface="Calibri" panose="020F0502020204030204" pitchFamily="34" charset="0"/>
+                <a:ea typeface="Calibri" panose="020F0502020204030204" pitchFamily="34" charset="0"/>
+                <a:cs typeface="Times New Roman" panose="02020603050405020304" pitchFamily="18" charset="0"/>
+              </a:rPr>
+              <a:t>Analysis</a:t>
+            </a:r>
+            <a:br>
+              <a:rPr lang="en-US" kern="100" dirty="0">
+                <a:effectLst/>
+                <a:latin typeface="Calibri" panose="020F0502020204030204" pitchFamily="34" charset="0"/>
+                <a:ea typeface="Calibri" panose="020F0502020204030204" pitchFamily="34" charset="0"/>
+                <a:cs typeface="Times New Roman" panose="02020603050405020304" pitchFamily="18" charset="0"/>
+              </a:rPr>
+            </a:br>
+            <a:r>
+              <a:rPr lang="en-US" sz="2400" kern="100" dirty="0">
+                <a:latin typeface="Calibri" panose="020F0502020204030204" pitchFamily="34" charset="0"/>
+                <a:ea typeface="Calibri" panose="020F0502020204030204" pitchFamily="34" charset="0"/>
+                <a:cs typeface="Times New Roman" panose="02020603050405020304" pitchFamily="18" charset="0"/>
+              </a:rPr>
+              <a:t>Per Month</a:t>
+            </a:r>
+            <a:br>
+              <a:rPr lang="en-US" sz="2400" kern="100" dirty="0">
+                <a:latin typeface="Calibri" panose="020F0502020204030204" pitchFamily="34" charset="0"/>
+                <a:ea typeface="Calibri" panose="020F0502020204030204" pitchFamily="34" charset="0"/>
+                <a:cs typeface="Times New Roman" panose="02020603050405020304" pitchFamily="18" charset="0"/>
+              </a:rPr>
+            </a:br>
+            <a:endParaRPr lang="en-US" dirty="0"/>
+          </a:p>
+        </p:txBody>
+      </p:sp>
+      <p:pic>
+        <p:nvPicPr>
+          <p:cNvPr id="6" name="Content Placeholder 5">
+            <a:extLst>
+              <a:ext uri="{FF2B5EF4-FFF2-40B4-BE49-F238E27FC236}">
+                <a16:creationId xmlns:a16="http://schemas.microsoft.com/office/drawing/2014/main" id="{1DE769E9-DA4F-D888-E705-2A6D5136C898}"/>
+              </a:ext>
+            </a:extLst>
+          </p:cNvPr>
+          <p:cNvPicPr>
+            <a:picLocks noGrp="1" noChangeAspect="1"/>
+          </p:cNvPicPr>
+          <p:nvPr>
+            <p:ph idx="1"/>
+          </p:nvPr>
+        </p:nvPicPr>
+        <p:blipFill rotWithShape="1">
+          <a:blip r:embed="rId2"/>
+          <a:srcRect l="15496" t="21608" r="11063" b="5366"/>
+          <a:stretch/>
+        </p:blipFill>
+        <p:spPr>
+          <a:xfrm>
+            <a:off x="646111" y="1640792"/>
+            <a:ext cx="7835160" cy="4382503"/>
+          </a:xfrm>
+        </p:spPr>
+      </p:pic>
+    </p:spTree>
+    <p:extLst>
+      <p:ext uri="{BB962C8B-B14F-4D97-AF65-F5344CB8AC3E}">
+        <p14:creationId xmlns:p14="http://schemas.microsoft.com/office/powerpoint/2010/main" val="2560716288"/>
+      </p:ext>
+    </p:extLst>
+  </p:cSld>
+  <p:clrMapOvr>
+    <a:masterClrMapping/>
+  </p:clrMapOvr>
+</p:sld>
+</file>
+
+<file path=ppt/slides/slide13.xml><?xml version="1.0" encoding="utf-8"?>
+<p:sld xmlns:a="http://schemas.openxmlformats.org/drawingml/2006/main" xmlns:r="http://schemas.openxmlformats.org/officeDocument/2006/relationships" xmlns:p="http://schemas.openxmlformats.org/presentationml/2006/main">
+  <p:cSld>
+    <p:spTree>
+      <p:nvGrpSpPr>
+        <p:cNvPr id="1" name=""/>
+        <p:cNvGrpSpPr/>
+        <p:nvPr/>
+      </p:nvGrpSpPr>
+      <p:grpSpPr>
+        <a:xfrm>
+          <a:off x="0" y="0"/>
+          <a:ext cx="0" cy="0"/>
+          <a:chOff x="0" y="0"/>
+          <a:chExt cx="0" cy="0"/>
+        </a:xfrm>
+      </p:grpSpPr>
+      <p:sp>
+        <p:nvSpPr>
+          <p:cNvPr id="2" name="Title 1">
+            <a:extLst>
+              <a:ext uri="{FF2B5EF4-FFF2-40B4-BE49-F238E27FC236}">
+                <a16:creationId xmlns:a16="http://schemas.microsoft.com/office/drawing/2014/main" id="{77B9CE2C-5798-329F-454E-1E9DD5FEE246}"/>
+              </a:ext>
+            </a:extLst>
+          </p:cNvPr>
+          <p:cNvSpPr>
+            <a:spLocks noGrp="1"/>
+          </p:cNvSpPr>
+          <p:nvPr>
+            <p:ph type="title"/>
+          </p:nvPr>
+        </p:nvSpPr>
+        <p:spPr/>
+        <p:txBody>
+          <a:bodyPr/>
+          <a:lstStyle/>
+          <a:p>
+            <a:r>
+              <a:rPr lang="en-US" kern="100" dirty="0">
+                <a:effectLst/>
+                <a:latin typeface="Calibri" panose="020F0502020204030204" pitchFamily="34" charset="0"/>
+                <a:ea typeface="Calibri" panose="020F0502020204030204" pitchFamily="34" charset="0"/>
+                <a:cs typeface="Times New Roman" panose="02020603050405020304" pitchFamily="18" charset="0"/>
+              </a:rPr>
+              <a:t>Price</a:t>
+            </a:r>
+            <a:r>
+              <a:rPr lang="en-US" sz="4000" kern="100" dirty="0">
+                <a:effectLst/>
+                <a:latin typeface="Calibri" panose="020F0502020204030204" pitchFamily="34" charset="0"/>
+                <a:ea typeface="Calibri" panose="020F0502020204030204" pitchFamily="34" charset="0"/>
+                <a:cs typeface="Times New Roman" panose="02020603050405020304" pitchFamily="18" charset="0"/>
+              </a:rPr>
+              <a:t> </a:t>
+            </a:r>
+            <a:r>
+              <a:rPr lang="en-US" kern="100" dirty="0">
+                <a:effectLst/>
+                <a:latin typeface="Calibri" panose="020F0502020204030204" pitchFamily="34" charset="0"/>
+                <a:ea typeface="Calibri" panose="020F0502020204030204" pitchFamily="34" charset="0"/>
+                <a:cs typeface="Times New Roman" panose="02020603050405020304" pitchFamily="18" charset="0"/>
+              </a:rPr>
+              <a:t>Analysis</a:t>
+            </a:r>
+            <a:br>
+              <a:rPr lang="en-US" kern="100" dirty="0">
+                <a:effectLst/>
+                <a:latin typeface="Calibri" panose="020F0502020204030204" pitchFamily="34" charset="0"/>
+                <a:ea typeface="Calibri" panose="020F0502020204030204" pitchFamily="34" charset="0"/>
+                <a:cs typeface="Times New Roman" panose="02020603050405020304" pitchFamily="18" charset="0"/>
+              </a:rPr>
+            </a:br>
+            <a:r>
+              <a:rPr lang="en-US" sz="2400" kern="100" dirty="0">
+                <a:latin typeface="Calibri" panose="020F0502020204030204" pitchFamily="34" charset="0"/>
+                <a:ea typeface="Calibri" panose="020F0502020204030204" pitchFamily="34" charset="0"/>
+                <a:cs typeface="Times New Roman" panose="02020603050405020304" pitchFamily="18" charset="0"/>
+              </a:rPr>
+              <a:t>Per Month and Year</a:t>
+            </a:r>
+            <a:br>
+              <a:rPr lang="en-US" sz="2400" kern="100" dirty="0">
+                <a:latin typeface="Calibri" panose="020F0502020204030204" pitchFamily="34" charset="0"/>
+                <a:ea typeface="Calibri" panose="020F0502020204030204" pitchFamily="34" charset="0"/>
+                <a:cs typeface="Times New Roman" panose="02020603050405020304" pitchFamily="18" charset="0"/>
+              </a:rPr>
+            </a:br>
+            <a:endParaRPr lang="en-US" dirty="0"/>
+          </a:p>
+        </p:txBody>
+      </p:sp>
+      <p:pic>
+        <p:nvPicPr>
+          <p:cNvPr id="7" name="Content Placeholder 6">
+            <a:extLst>
+              <a:ext uri="{FF2B5EF4-FFF2-40B4-BE49-F238E27FC236}">
+                <a16:creationId xmlns:a16="http://schemas.microsoft.com/office/drawing/2014/main" id="{1AE3D5E2-82BA-4BEA-E51A-AC9D3FDDD3E1}"/>
+              </a:ext>
+            </a:extLst>
+          </p:cNvPr>
+          <p:cNvPicPr>
+            <a:picLocks noGrp="1" noChangeAspect="1"/>
+          </p:cNvPicPr>
+          <p:nvPr>
+            <p:ph idx="1"/>
+          </p:nvPr>
+        </p:nvPicPr>
+        <p:blipFill rotWithShape="1">
+          <a:blip r:embed="rId2"/>
+          <a:srcRect l="16509" t="19458" r="11287" b="8164"/>
+          <a:stretch/>
+        </p:blipFill>
+        <p:spPr>
+          <a:xfrm>
+            <a:off x="746620" y="1554027"/>
+            <a:ext cx="7717872" cy="4351824"/>
+          </a:xfrm>
+        </p:spPr>
+      </p:pic>
+    </p:spTree>
+    <p:extLst>
+      <p:ext uri="{BB962C8B-B14F-4D97-AF65-F5344CB8AC3E}">
+        <p14:creationId xmlns:p14="http://schemas.microsoft.com/office/powerpoint/2010/main" val="2072485931"/>
+      </p:ext>
+    </p:extLst>
+  </p:cSld>
+  <p:clrMapOvr>
+    <a:masterClrMapping/>
+  </p:clrMapOvr>
+</p:sld>
+</file>
+
+<file path=ppt/slides/slide14.xml><?xml version="1.0" encoding="utf-8"?>
+<p:sld xmlns:a="http://schemas.openxmlformats.org/drawingml/2006/main" xmlns:r="http://schemas.openxmlformats.org/officeDocument/2006/relationships" xmlns:p="http://schemas.openxmlformats.org/presentationml/2006/main">
+  <p:cSld>
+    <p:spTree>
+      <p:nvGrpSpPr>
+        <p:cNvPr id="1" name=""/>
+        <p:cNvGrpSpPr/>
+        <p:nvPr/>
+      </p:nvGrpSpPr>
+      <p:grpSpPr>
+        <a:xfrm>
+          <a:off x="0" y="0"/>
+          <a:ext cx="0" cy="0"/>
+          <a:chOff x="0" y="0"/>
+          <a:chExt cx="0" cy="0"/>
+        </a:xfrm>
+      </p:grpSpPr>
+      <p:sp>
+        <p:nvSpPr>
+          <p:cNvPr id="2" name="Title 1">
+            <a:extLst>
+              <a:ext uri="{FF2B5EF4-FFF2-40B4-BE49-F238E27FC236}">
                 <a16:creationId xmlns:a16="http://schemas.microsoft.com/office/drawing/2014/main" id="{77B9CE2C-5798-329F-454E-1E9DD5FEE246}"/>
               </a:ext>
             </a:extLst>
@@ -6305,7 +6833,223 @@
 </p:sld>
 </file>
 
-<file path=ppt/slides/slide11.xml><?xml version="1.0" encoding="utf-8"?>
+<file path=ppt/slides/slide15.xml><?xml version="1.0" encoding="utf-8"?>
+<p:sld xmlns:a="http://schemas.openxmlformats.org/drawingml/2006/main" xmlns:r="http://schemas.openxmlformats.org/officeDocument/2006/relationships" xmlns:p="http://schemas.openxmlformats.org/presentationml/2006/main">
+  <p:cSld>
+    <p:spTree>
+      <p:nvGrpSpPr>
+        <p:cNvPr id="1" name=""/>
+        <p:cNvGrpSpPr/>
+        <p:nvPr/>
+      </p:nvGrpSpPr>
+      <p:grpSpPr>
+        <a:xfrm>
+          <a:off x="0" y="0"/>
+          <a:ext cx="0" cy="0"/>
+          <a:chOff x="0" y="0"/>
+          <a:chExt cx="0" cy="0"/>
+        </a:xfrm>
+      </p:grpSpPr>
+      <p:sp>
+        <p:nvSpPr>
+          <p:cNvPr id="2" name="Title 1">
+            <a:extLst>
+              <a:ext uri="{FF2B5EF4-FFF2-40B4-BE49-F238E27FC236}">
+                <a16:creationId xmlns:a16="http://schemas.microsoft.com/office/drawing/2014/main" id="{FA046525-605C-93CE-FFF8-46B81114FE12}"/>
+              </a:ext>
+            </a:extLst>
+          </p:cNvPr>
+          <p:cNvSpPr>
+            <a:spLocks noGrp="1"/>
+          </p:cNvSpPr>
+          <p:nvPr>
+            <p:ph type="title"/>
+          </p:nvPr>
+        </p:nvSpPr>
+        <p:spPr/>
+        <p:txBody>
+          <a:bodyPr/>
+          <a:lstStyle/>
+          <a:p>
+            <a:r>
+              <a:rPr lang="en-US" dirty="0"/>
+              <a:t>Data Analysis Outcomes</a:t>
+            </a:r>
+            <a:br>
+              <a:rPr lang="en-US" dirty="0"/>
+            </a:br>
+            <a:r>
+              <a:rPr lang="en-US" sz="3200" kern="100" dirty="0">
+                <a:latin typeface="Calibri" panose="020F0502020204030204" pitchFamily="34" charset="0"/>
+                <a:ea typeface="Calibri" panose="020F0502020204030204" pitchFamily="34" charset="0"/>
+                <a:cs typeface="Times New Roman" panose="02020603050405020304" pitchFamily="18" charset="0"/>
+              </a:rPr>
+              <a:t>Price Analysis:</a:t>
+            </a:r>
+            <a:br>
+              <a:rPr lang="en-US" kern="100" dirty="0">
+                <a:latin typeface="Calibri" panose="020F0502020204030204" pitchFamily="34" charset="0"/>
+                <a:ea typeface="Calibri" panose="020F0502020204030204" pitchFamily="34" charset="0"/>
+                <a:cs typeface="Times New Roman" panose="02020603050405020304" pitchFamily="18" charset="0"/>
+              </a:rPr>
+            </a:br>
+            <a:endParaRPr lang="en-US" dirty="0"/>
+          </a:p>
+        </p:txBody>
+      </p:sp>
+      <p:sp>
+        <p:nvSpPr>
+          <p:cNvPr id="3" name="Content Placeholder 2">
+            <a:extLst>
+              <a:ext uri="{FF2B5EF4-FFF2-40B4-BE49-F238E27FC236}">
+                <a16:creationId xmlns:a16="http://schemas.microsoft.com/office/drawing/2014/main" id="{D753B325-C879-4089-E5E6-4277E190B39D}"/>
+              </a:ext>
+            </a:extLst>
+          </p:cNvPr>
+          <p:cNvSpPr>
+            <a:spLocks noGrp="1"/>
+          </p:cNvSpPr>
+          <p:nvPr>
+            <p:ph idx="1"/>
+          </p:nvPr>
+        </p:nvSpPr>
+        <p:spPr>
+          <a:xfrm>
+            <a:off x="646111" y="1985806"/>
+            <a:ext cx="8946541" cy="4195481"/>
+          </a:xfrm>
+        </p:spPr>
+        <p:txBody>
+          <a:bodyPr>
+            <a:normAutofit/>
+          </a:bodyPr>
+          <a:lstStyle/>
+          <a:p>
+            <a:r>
+              <a:rPr lang="en-US" sz="2400" kern="100" dirty="0">
+                <a:latin typeface="Calibri" panose="020F0502020204030204" pitchFamily="34" charset="0"/>
+                <a:cs typeface="Times New Roman" panose="02020603050405020304" pitchFamily="18" charset="0"/>
+              </a:rPr>
+              <a:t>The average daily rate is higher from April – August</a:t>
+            </a:r>
+          </a:p>
+          <a:p>
+            <a:pPr marL="742950" lvl="2" indent="-342900"/>
+            <a:r>
+              <a:rPr lang="en-US" sz="2200" kern="100" dirty="0">
+                <a:latin typeface="Calibri" panose="020F0502020204030204" pitchFamily="34" charset="0"/>
+                <a:cs typeface="Times New Roman" panose="02020603050405020304" pitchFamily="18" charset="0"/>
+              </a:rPr>
+              <a:t>For year 2015 this is not absolutely true – prices where high from February - August</a:t>
+            </a:r>
+          </a:p>
+          <a:p>
+            <a:r>
+              <a:rPr lang="en-US" sz="2400" kern="100" dirty="0">
+                <a:latin typeface="Calibri" panose="020F0502020204030204" pitchFamily="34" charset="0"/>
+                <a:cs typeface="Times New Roman" panose="02020603050405020304" pitchFamily="18" charset="0"/>
+              </a:rPr>
+              <a:t>The average rate evolution is smoother for city hotels</a:t>
+            </a:r>
+          </a:p>
+          <a:p>
+            <a:r>
+              <a:rPr lang="en-US" sz="2400" kern="100" dirty="0">
+                <a:latin typeface="Calibri" panose="020F0502020204030204" pitchFamily="34" charset="0"/>
+                <a:cs typeface="Times New Roman" panose="02020603050405020304" pitchFamily="18" charset="0"/>
+              </a:rPr>
+              <a:t>Increases in average rate are identified on September 2016 &amp; 2017</a:t>
+            </a:r>
+          </a:p>
+          <a:p>
+            <a:pPr marL="0" indent="0">
+              <a:buNone/>
+            </a:pPr>
+            <a:endParaRPr lang="en-US" dirty="0"/>
+          </a:p>
+        </p:txBody>
+      </p:sp>
+    </p:spTree>
+    <p:extLst>
+      <p:ext uri="{BB962C8B-B14F-4D97-AF65-F5344CB8AC3E}">
+        <p14:creationId xmlns:p14="http://schemas.microsoft.com/office/powerpoint/2010/main" val="178969001"/>
+      </p:ext>
+    </p:extLst>
+  </p:cSld>
+  <p:clrMapOvr>
+    <a:masterClrMapping/>
+  </p:clrMapOvr>
+</p:sld>
+</file>
+
+<file path=ppt/slides/slide16.xml><?xml version="1.0" encoding="utf-8"?>
+<p:sld xmlns:a="http://schemas.openxmlformats.org/drawingml/2006/main" xmlns:r="http://schemas.openxmlformats.org/officeDocument/2006/relationships" xmlns:p="http://schemas.openxmlformats.org/presentationml/2006/main">
+  <p:cSld>
+    <p:spTree>
+      <p:nvGrpSpPr>
+        <p:cNvPr id="1" name=""/>
+        <p:cNvGrpSpPr/>
+        <p:nvPr/>
+      </p:nvGrpSpPr>
+      <p:grpSpPr>
+        <a:xfrm>
+          <a:off x="0" y="0"/>
+          <a:ext cx="0" cy="0"/>
+          <a:chOff x="0" y="0"/>
+          <a:chExt cx="0" cy="0"/>
+        </a:xfrm>
+      </p:grpSpPr>
+      <p:sp>
+        <p:nvSpPr>
+          <p:cNvPr id="2" name="Title 1">
+            <a:extLst>
+              <a:ext uri="{FF2B5EF4-FFF2-40B4-BE49-F238E27FC236}">
+                <a16:creationId xmlns:a16="http://schemas.microsoft.com/office/drawing/2014/main" id="{DC1D68CF-A6F6-E5B3-B472-9AA82104696A}"/>
+              </a:ext>
+            </a:extLst>
+          </p:cNvPr>
+          <p:cNvSpPr>
+            <a:spLocks noGrp="1"/>
+          </p:cNvSpPr>
+          <p:nvPr>
+            <p:ph type="ctrTitle"/>
+          </p:nvPr>
+        </p:nvSpPr>
+        <p:spPr>
+          <a:xfrm>
+            <a:off x="257333" y="189452"/>
+            <a:ext cx="8825658" cy="3329581"/>
+          </a:xfrm>
+        </p:spPr>
+        <p:txBody>
+          <a:bodyPr/>
+          <a:lstStyle/>
+          <a:p>
+            <a:r>
+              <a:rPr lang="en-US" sz="6000"/>
+              <a:t>Reservation </a:t>
+            </a:r>
+            <a:r>
+              <a:rPr lang="en-US" sz="6000" dirty="0"/>
+              <a:t>Analysis</a:t>
+            </a:r>
+          </a:p>
+        </p:txBody>
+      </p:sp>
+    </p:spTree>
+    <p:extLst>
+      <p:ext uri="{BB962C8B-B14F-4D97-AF65-F5344CB8AC3E}">
+        <p14:creationId xmlns:p14="http://schemas.microsoft.com/office/powerpoint/2010/main" val="2220121082"/>
+      </p:ext>
+    </p:extLst>
+  </p:cSld>
+  <p:clrMapOvr>
+    <a:masterClrMapping/>
+  </p:clrMapOvr>
+</p:sld>
+</file>
+
+<file path=ppt/slides/slide17.xml><?xml version="1.0" encoding="utf-8"?>
 <p:sld xmlns:a="http://schemas.openxmlformats.org/drawingml/2006/main" xmlns:r="http://schemas.openxmlformats.org/officeDocument/2006/relationships" xmlns:p="http://schemas.openxmlformats.org/presentationml/2006/main">
   <p:cSld>
     <p:spTree>
@@ -6438,7 +7182,7 @@
 </p:sld>
 </file>
 
-<file path=ppt/slides/slide12.xml><?xml version="1.0" encoding="utf-8"?>
+<file path=ppt/slides/slide18.xml><?xml version="1.0" encoding="utf-8"?>
 <p:sld xmlns:a="http://schemas.openxmlformats.org/drawingml/2006/main" xmlns:r="http://schemas.openxmlformats.org/officeDocument/2006/relationships" xmlns:p="http://schemas.openxmlformats.org/presentationml/2006/main">
   <p:cSld>
     <p:spTree>
@@ -6571,7 +7315,7 @@
 </p:sld>
 </file>
 
-<file path=ppt/slides/slide13.xml><?xml version="1.0" encoding="utf-8"?>
+<file path=ppt/slides/slide19.xml><?xml version="1.0" encoding="utf-8"?>
 <p:sld xmlns:a="http://schemas.openxmlformats.org/drawingml/2006/main" xmlns:r="http://schemas.openxmlformats.org/officeDocument/2006/relationships" xmlns:p="http://schemas.openxmlformats.org/presentationml/2006/main">
   <p:cSld>
     <p:spTree>
@@ -6613,6 +7357,27 @@
               <a:rPr lang="en-US" dirty="0"/>
               <a:t>Data Analysis Outcomes</a:t>
             </a:r>
+            <a:br>
+              <a:rPr lang="en-US" dirty="0"/>
+            </a:br>
+            <a:r>
+              <a:rPr lang="en-US" sz="3200" kern="100" dirty="0">
+                <a:effectLst/>
+                <a:latin typeface="Calibri" panose="020F0502020204030204" pitchFamily="34" charset="0"/>
+                <a:ea typeface="Calibri" panose="020F0502020204030204" pitchFamily="34" charset="0"/>
+                <a:cs typeface="Times New Roman" panose="02020603050405020304" pitchFamily="18" charset="0"/>
+              </a:rPr>
+              <a:t>Reservation Analysis:</a:t>
+            </a:r>
+            <a:br>
+              <a:rPr lang="en-US" sz="4000" kern="100" dirty="0">
+                <a:effectLst/>
+                <a:latin typeface="Calibri" panose="020F0502020204030204" pitchFamily="34" charset="0"/>
+                <a:ea typeface="Calibri" panose="020F0502020204030204" pitchFamily="34" charset="0"/>
+                <a:cs typeface="Times New Roman" panose="02020603050405020304" pitchFamily="18" charset="0"/>
+              </a:rPr>
+            </a:br>
+            <a:endParaRPr lang="en-US" dirty="0"/>
           </a:p>
         </p:txBody>
       </p:sp>
@@ -6634,242 +7399,31 @@
         </p:nvSpPr>
         <p:spPr>
           <a:xfrm>
-            <a:off x="1104293" y="1255964"/>
+            <a:off x="646111" y="1935472"/>
             <a:ext cx="8946541" cy="4195481"/>
           </a:xfrm>
         </p:spPr>
         <p:txBody>
           <a:bodyPr>
-            <a:normAutofit fontScale="92500" lnSpcReduction="20000"/>
+            <a:normAutofit/>
           </a:bodyPr>
           <a:lstStyle/>
           <a:p>
             <a:r>
               <a:rPr lang="en-US" kern="100" dirty="0">
-                <a:effectLst/>
-                <a:latin typeface="Calibri" panose="020F0502020204030204" pitchFamily="34" charset="0"/>
-                <a:ea typeface="Calibri" panose="020F0502020204030204" pitchFamily="34" charset="0"/>
-                <a:cs typeface="Times New Roman" panose="02020603050405020304" pitchFamily="18" charset="0"/>
-              </a:rPr>
-              <a:t>Cancellation</a:t>
-            </a:r>
-            <a:r>
-              <a:rPr lang="en-US" sz="1800" kern="100" dirty="0">
-                <a:effectLst/>
-                <a:latin typeface="Calibri" panose="020F0502020204030204" pitchFamily="34" charset="0"/>
-                <a:ea typeface="Calibri" panose="020F0502020204030204" pitchFamily="34" charset="0"/>
-                <a:cs typeface="Times New Roman" panose="02020603050405020304" pitchFamily="18" charset="0"/>
-              </a:rPr>
-              <a:t> </a:t>
-            </a:r>
+                <a:latin typeface="Calibri" panose="020F0502020204030204" pitchFamily="34" charset="0"/>
+                <a:cs typeface="Times New Roman" panose="02020603050405020304" pitchFamily="18" charset="0"/>
+              </a:rPr>
+              <a:t>Most reservations take place from Tas Online </a:t>
+            </a:r>
+          </a:p>
+          <a:p>
             <a:r>
               <a:rPr lang="en-US" kern="100" dirty="0">
-                <a:effectLst/>
-                <a:latin typeface="Calibri" panose="020F0502020204030204" pitchFamily="34" charset="0"/>
-                <a:ea typeface="Calibri" panose="020F0502020204030204" pitchFamily="34" charset="0"/>
-                <a:cs typeface="Times New Roman" panose="02020603050405020304" pitchFamily="18" charset="0"/>
-              </a:rPr>
-              <a:t>of</a:t>
-            </a:r>
-            <a:r>
-              <a:rPr lang="en-US" sz="1800" kern="100" dirty="0">
-                <a:effectLst/>
-                <a:latin typeface="Calibri" panose="020F0502020204030204" pitchFamily="34" charset="0"/>
-                <a:ea typeface="Calibri" panose="020F0502020204030204" pitchFamily="34" charset="0"/>
-                <a:cs typeface="Times New Roman" panose="02020603050405020304" pitchFamily="18" charset="0"/>
-              </a:rPr>
-              <a:t> </a:t>
-            </a:r>
-            <a:r>
-              <a:rPr lang="en-US" kern="100" dirty="0">
-                <a:effectLst/>
-                <a:latin typeface="Calibri" panose="020F0502020204030204" pitchFamily="34" charset="0"/>
-                <a:ea typeface="Calibri" panose="020F0502020204030204" pitchFamily="34" charset="0"/>
-                <a:cs typeface="Times New Roman" panose="02020603050405020304" pitchFamily="18" charset="0"/>
-              </a:rPr>
-              <a:t>Reservation Analysis</a:t>
-            </a:r>
-            <a:r>
-              <a:rPr lang="en-US" kern="100" dirty="0">
-                <a:latin typeface="Calibri" panose="020F0502020204030204" pitchFamily="34" charset="0"/>
-                <a:ea typeface="Calibri" panose="020F0502020204030204" pitchFamily="34" charset="0"/>
-                <a:cs typeface="Times New Roman" panose="02020603050405020304" pitchFamily="18" charset="0"/>
-              </a:rPr>
-              <a:t>:</a:t>
-            </a:r>
-          </a:p>
-          <a:p>
-            <a:pPr>
-              <a:buFont typeface="Wingdings" panose="05000000000000000000" pitchFamily="2" charset="2"/>
-              <a:buChar char="Ø"/>
-            </a:pPr>
-            <a:r>
-              <a:rPr lang="en-US" sz="1700" kern="100" dirty="0">
-                <a:latin typeface="Calibri" panose="020F0502020204030204" pitchFamily="34" charset="0"/>
-                <a:ea typeface="Calibri" panose="020F0502020204030204" pitchFamily="34" charset="0"/>
-                <a:cs typeface="Times New Roman" panose="02020603050405020304" pitchFamily="18" charset="0"/>
-              </a:rPr>
-              <a:t>Countries with lower cancellation percentage are GBR, IRL, BEL, IRL</a:t>
-            </a:r>
-          </a:p>
-          <a:p>
-            <a:pPr>
-              <a:buFont typeface="Wingdings" panose="05000000000000000000" pitchFamily="2" charset="2"/>
-              <a:buChar char="Ø"/>
-            </a:pPr>
-            <a:r>
-              <a:rPr lang="en-US" sz="1700" kern="100" dirty="0">
-                <a:effectLst/>
-                <a:latin typeface="Calibri" panose="020F0502020204030204" pitchFamily="34" charset="0"/>
-                <a:ea typeface="Calibri" panose="020F0502020204030204" pitchFamily="34" charset="0"/>
-                <a:cs typeface="Times New Roman" panose="02020603050405020304" pitchFamily="18" charset="0"/>
-              </a:rPr>
-              <a:t>Cancellation percentage is higher </a:t>
-            </a:r>
-            <a:r>
-              <a:rPr lang="en-US" sz="1700" kern="100" dirty="0">
-                <a:latin typeface="Calibri" panose="020F0502020204030204" pitchFamily="34" charset="0"/>
-                <a:ea typeface="Calibri" panose="020F0502020204030204" pitchFamily="34" charset="0"/>
-                <a:cs typeface="Times New Roman" panose="02020603050405020304" pitchFamily="18" charset="0"/>
-              </a:rPr>
-              <a:t>for Online TA and Groups</a:t>
-            </a:r>
-          </a:p>
-          <a:p>
-            <a:pPr>
-              <a:buFont typeface="Wingdings" panose="05000000000000000000" pitchFamily="2" charset="2"/>
-              <a:buChar char="Ø"/>
-            </a:pPr>
-            <a:r>
-              <a:rPr lang="en-US" sz="1700" kern="100" dirty="0">
-                <a:effectLst/>
-                <a:latin typeface="Calibri" panose="020F0502020204030204" pitchFamily="34" charset="0"/>
-                <a:ea typeface="Calibri" panose="020F0502020204030204" pitchFamily="34" charset="0"/>
-                <a:cs typeface="Times New Roman" panose="02020603050405020304" pitchFamily="18" charset="0"/>
-              </a:rPr>
-              <a:t>Resort Hotels have lower cancellation rate vs City Hotels</a:t>
-            </a:r>
-          </a:p>
-          <a:p>
-            <a:pPr>
-              <a:buFont typeface="Wingdings" panose="05000000000000000000" pitchFamily="2" charset="2"/>
-              <a:buChar char="Ø"/>
-            </a:pPr>
-            <a:r>
-              <a:rPr lang="en-US" sz="1700" kern="100" dirty="0">
-                <a:effectLst/>
-                <a:latin typeface="Calibri" panose="020F0502020204030204" pitchFamily="34" charset="0"/>
-                <a:ea typeface="Calibri" panose="020F0502020204030204" pitchFamily="34" charset="0"/>
-                <a:cs typeface="Times New Roman" panose="02020603050405020304" pitchFamily="18" charset="0"/>
-              </a:rPr>
-              <a:t>For lead time over 50 days, cancellation chances are higher</a:t>
-            </a:r>
-          </a:p>
-          <a:p>
-            <a:r>
-              <a:rPr lang="en-US" kern="100" dirty="0">
-                <a:latin typeface="Calibri" panose="020F0502020204030204" pitchFamily="34" charset="0"/>
-                <a:ea typeface="Calibri" panose="020F0502020204030204" pitchFamily="34" charset="0"/>
-                <a:cs typeface="Times New Roman" panose="02020603050405020304" pitchFamily="18" charset="0"/>
-              </a:rPr>
-              <a:t>Price</a:t>
-            </a:r>
-            <a:r>
-              <a:rPr lang="en-US" sz="1800" kern="100" dirty="0">
-                <a:latin typeface="Calibri" panose="020F0502020204030204" pitchFamily="34" charset="0"/>
-                <a:ea typeface="Calibri" panose="020F0502020204030204" pitchFamily="34" charset="0"/>
-                <a:cs typeface="Times New Roman" panose="02020603050405020304" pitchFamily="18" charset="0"/>
-              </a:rPr>
-              <a:t> </a:t>
-            </a:r>
-            <a:r>
-              <a:rPr lang="en-US" kern="100" dirty="0">
-                <a:latin typeface="Calibri" panose="020F0502020204030204" pitchFamily="34" charset="0"/>
-                <a:ea typeface="Calibri" panose="020F0502020204030204" pitchFamily="34" charset="0"/>
-                <a:cs typeface="Times New Roman" panose="02020603050405020304" pitchFamily="18" charset="0"/>
-              </a:rPr>
-              <a:t>Analysis:</a:t>
-            </a:r>
-          </a:p>
-          <a:p>
-            <a:pPr>
-              <a:buFont typeface="Wingdings" panose="05000000000000000000" pitchFamily="2" charset="2"/>
-              <a:buChar char="Ø"/>
-            </a:pPr>
-            <a:r>
-              <a:rPr lang="en-US" sz="1700" kern="100" dirty="0">
-                <a:latin typeface="Calibri" panose="020F0502020204030204" pitchFamily="34" charset="0"/>
-                <a:cs typeface="Times New Roman" panose="02020603050405020304" pitchFamily="18" charset="0"/>
-              </a:rPr>
-              <a:t>The average daily rate is higher from April – August</a:t>
-            </a:r>
-          </a:p>
-          <a:p>
-            <a:pPr>
-              <a:buFont typeface="Wingdings" panose="05000000000000000000" pitchFamily="2" charset="2"/>
-              <a:buChar char="Ø"/>
-            </a:pPr>
-            <a:r>
-              <a:rPr lang="en-US" sz="1700" kern="100" dirty="0">
-                <a:latin typeface="Calibri" panose="020F0502020204030204" pitchFamily="34" charset="0"/>
-                <a:cs typeface="Times New Roman" panose="02020603050405020304" pitchFamily="18" charset="0"/>
-              </a:rPr>
-              <a:t>The average rate evolution is smoother for city hotels</a:t>
-            </a:r>
-          </a:p>
-          <a:p>
-            <a:pPr>
-              <a:buFont typeface="Wingdings" panose="05000000000000000000" pitchFamily="2" charset="2"/>
-              <a:buChar char="Ø"/>
-            </a:pPr>
-            <a:r>
-              <a:rPr lang="en-US" sz="1700" kern="100" dirty="0">
-                <a:latin typeface="Calibri" panose="020F0502020204030204" pitchFamily="34" charset="0"/>
-                <a:cs typeface="Times New Roman" panose="02020603050405020304" pitchFamily="18" charset="0"/>
-              </a:rPr>
-              <a:t>Increases in average rate are identified on September 2016 &amp; 2017</a:t>
-            </a:r>
-          </a:p>
-          <a:p>
-            <a:r>
-              <a:rPr lang="en-US" kern="100" dirty="0">
-                <a:effectLst/>
-                <a:latin typeface="Calibri" panose="020F0502020204030204" pitchFamily="34" charset="0"/>
-                <a:ea typeface="Calibri" panose="020F0502020204030204" pitchFamily="34" charset="0"/>
-                <a:cs typeface="Times New Roman" panose="02020603050405020304" pitchFamily="18" charset="0"/>
-              </a:rPr>
-              <a:t>Reservation Analysis:</a:t>
-            </a:r>
-            <a:endParaRPr lang="en-US" sz="1800" kern="100" dirty="0">
-              <a:latin typeface="Calibri" panose="020F0502020204030204" pitchFamily="34" charset="0"/>
-              <a:ea typeface="Calibri" panose="020F0502020204030204" pitchFamily="34" charset="0"/>
-              <a:cs typeface="Times New Roman" panose="02020603050405020304" pitchFamily="18" charset="0"/>
-            </a:endParaRPr>
-          </a:p>
-          <a:p>
-            <a:pPr>
-              <a:buFont typeface="Wingdings" panose="05000000000000000000" pitchFamily="2" charset="2"/>
-              <a:buChar char="Ø"/>
-            </a:pPr>
-            <a:r>
-              <a:rPr lang="en-US" sz="1700" kern="100" dirty="0">
-                <a:latin typeface="Calibri" panose="020F0502020204030204" pitchFamily="34" charset="0"/>
-                <a:cs typeface="Times New Roman" panose="02020603050405020304" pitchFamily="18" charset="0"/>
-              </a:rPr>
-              <a:t>Most reservations take place from Online TAs</a:t>
-            </a:r>
-          </a:p>
-          <a:p>
-            <a:pPr>
-              <a:buFont typeface="Wingdings" panose="05000000000000000000" pitchFamily="2" charset="2"/>
-              <a:buChar char="Ø"/>
-            </a:pPr>
-            <a:r>
-              <a:rPr lang="en-US" sz="1700" kern="100" dirty="0">
-                <a:latin typeface="Calibri" panose="020F0502020204030204" pitchFamily="34" charset="0"/>
-                <a:cs typeface="Times New Roman" panose="02020603050405020304" pitchFamily="18" charset="0"/>
-              </a:rPr>
-              <a:t>Room type A and D are more popular</a:t>
+                <a:latin typeface="Calibri" panose="020F0502020204030204" pitchFamily="34" charset="0"/>
+                <a:cs typeface="Times New Roman" panose="02020603050405020304" pitchFamily="18" charset="0"/>
+              </a:rPr>
+              <a:t>Room types A and D are more popular</a:t>
             </a:r>
           </a:p>
           <a:p>
@@ -6880,7 +7434,7 @@
     </p:spTree>
     <p:extLst>
       <p:ext uri="{BB962C8B-B14F-4D97-AF65-F5344CB8AC3E}">
-        <p14:creationId xmlns:p14="http://schemas.microsoft.com/office/powerpoint/2010/main" val="3597321058"/>
+        <p14:creationId xmlns:p14="http://schemas.microsoft.com/office/powerpoint/2010/main" val="2678467133"/>
       </p:ext>
     </p:extLst>
   </p:cSld>
@@ -7092,7 +7646,12 @@
             <p:ph idx="1"/>
           </p:nvPr>
         </p:nvSpPr>
-        <p:spPr/>
+        <p:spPr>
+          <a:xfrm>
+            <a:off x="767752" y="1398577"/>
+            <a:ext cx="8946541" cy="4195481"/>
+          </a:xfrm>
+        </p:spPr>
         <p:txBody>
           <a:bodyPr/>
           <a:lstStyle/>
@@ -7546,6 +8105,69 @@
           <p:cNvPr id="2" name="Title 1">
             <a:extLst>
               <a:ext uri="{FF2B5EF4-FFF2-40B4-BE49-F238E27FC236}">
+                <a16:creationId xmlns:a16="http://schemas.microsoft.com/office/drawing/2014/main" id="{DC1D68CF-A6F6-E5B3-B472-9AA82104696A}"/>
+              </a:ext>
+            </a:extLst>
+          </p:cNvPr>
+          <p:cNvSpPr>
+            <a:spLocks noGrp="1"/>
+          </p:cNvSpPr>
+          <p:nvPr>
+            <p:ph type="ctrTitle"/>
+          </p:nvPr>
+        </p:nvSpPr>
+        <p:spPr>
+          <a:xfrm>
+            <a:off x="257333" y="189452"/>
+            <a:ext cx="8825658" cy="3329581"/>
+          </a:xfrm>
+        </p:spPr>
+        <p:txBody>
+          <a:bodyPr/>
+          <a:lstStyle/>
+          <a:p>
+            <a:r>
+              <a:rPr lang="en-US" sz="6000" dirty="0"/>
+              <a:t>Cancellation Analysis</a:t>
+            </a:r>
+          </a:p>
+        </p:txBody>
+      </p:sp>
+    </p:spTree>
+    <p:extLst>
+      <p:ext uri="{BB962C8B-B14F-4D97-AF65-F5344CB8AC3E}">
+        <p14:creationId xmlns:p14="http://schemas.microsoft.com/office/powerpoint/2010/main" val="4074409869"/>
+      </p:ext>
+    </p:extLst>
+  </p:cSld>
+  <p:clrMapOvr>
+    <a:masterClrMapping/>
+  </p:clrMapOvr>
+</p:sld>
+</file>
+
+<file path=ppt/slides/slide6.xml><?xml version="1.0" encoding="utf-8"?>
+<p:sld xmlns:a="http://schemas.openxmlformats.org/drawingml/2006/main" xmlns:r="http://schemas.openxmlformats.org/officeDocument/2006/relationships" xmlns:p="http://schemas.openxmlformats.org/presentationml/2006/main">
+  <p:cSld>
+    <p:spTree>
+      <p:nvGrpSpPr>
+        <p:cNvPr id="1" name=""/>
+        <p:cNvGrpSpPr/>
+        <p:nvPr/>
+      </p:nvGrpSpPr>
+      <p:grpSpPr>
+        <a:xfrm>
+          <a:off x="0" y="0"/>
+          <a:ext cx="0" cy="0"/>
+          <a:chOff x="0" y="0"/>
+          <a:chExt cx="0" cy="0"/>
+        </a:xfrm>
+      </p:grpSpPr>
+      <p:sp>
+        <p:nvSpPr>
+          <p:cNvPr id="2" name="Title 1">
+            <a:extLst>
+              <a:ext uri="{FF2B5EF4-FFF2-40B4-BE49-F238E27FC236}">
                 <a16:creationId xmlns:a16="http://schemas.microsoft.com/office/drawing/2014/main" id="{77B9CE2C-5798-329F-454E-1E9DD5FEE246}"/>
               </a:ext>
             </a:extLst>
@@ -7665,7 +8287,7 @@
 </p:sld>
 </file>
 
-<file path=ppt/slides/slide6.xml><?xml version="1.0" encoding="utf-8"?>
+<file path=ppt/slides/slide7.xml><?xml version="1.0" encoding="utf-8"?>
 <p:sld xmlns:a="http://schemas.openxmlformats.org/drawingml/2006/main" xmlns:r="http://schemas.openxmlformats.org/officeDocument/2006/relationships" xmlns:p="http://schemas.openxmlformats.org/presentationml/2006/main">
   <p:cSld>
     <p:spTree>
@@ -7792,7 +8414,7 @@
 </p:sld>
 </file>
 
-<file path=ppt/slides/slide7.xml><?xml version="1.0" encoding="utf-8"?>
+<file path=ppt/slides/slide8.xml><?xml version="1.0" encoding="utf-8"?>
 <p:sld xmlns:a="http://schemas.openxmlformats.org/drawingml/2006/main" xmlns:r="http://schemas.openxmlformats.org/officeDocument/2006/relationships" xmlns:p="http://schemas.openxmlformats.org/presentationml/2006/main">
   <p:cSld>
     <p:spTree>
@@ -7925,7 +8547,7 @@
 </p:sld>
 </file>
 
-<file path=ppt/slides/slide8.xml><?xml version="1.0" encoding="utf-8"?>
+<file path=ppt/slides/slide9.xml><?xml version="1.0" encoding="utf-8"?>
 <p:sld xmlns:a="http://schemas.openxmlformats.org/drawingml/2006/main" xmlns:r="http://schemas.openxmlformats.org/officeDocument/2006/relationships" xmlns:p="http://schemas.openxmlformats.org/presentationml/2006/main">
   <p:cSld>
     <p:spTree>
@@ -8049,139 +8671,6 @@
     <p:extLst>
       <p:ext uri="{BB962C8B-B14F-4D97-AF65-F5344CB8AC3E}">
         <p14:creationId xmlns:p14="http://schemas.microsoft.com/office/powerpoint/2010/main" val="125649561"/>
-      </p:ext>
-    </p:extLst>
-  </p:cSld>
-  <p:clrMapOvr>
-    <a:masterClrMapping/>
-  </p:clrMapOvr>
-</p:sld>
-</file>
-
-<file path=ppt/slides/slide9.xml><?xml version="1.0" encoding="utf-8"?>
-<p:sld xmlns:a="http://schemas.openxmlformats.org/drawingml/2006/main" xmlns:r="http://schemas.openxmlformats.org/officeDocument/2006/relationships" xmlns:p="http://schemas.openxmlformats.org/presentationml/2006/main">
-  <p:cSld>
-    <p:spTree>
-      <p:nvGrpSpPr>
-        <p:cNvPr id="1" name=""/>
-        <p:cNvGrpSpPr/>
-        <p:nvPr/>
-      </p:nvGrpSpPr>
-      <p:grpSpPr>
-        <a:xfrm>
-          <a:off x="0" y="0"/>
-          <a:ext cx="0" cy="0"/>
-          <a:chOff x="0" y="0"/>
-          <a:chExt cx="0" cy="0"/>
-        </a:xfrm>
-      </p:grpSpPr>
-      <p:sp>
-        <p:nvSpPr>
-          <p:cNvPr id="2" name="Title 1">
-            <a:extLst>
-              <a:ext uri="{FF2B5EF4-FFF2-40B4-BE49-F238E27FC236}">
-                <a16:creationId xmlns:a16="http://schemas.microsoft.com/office/drawing/2014/main" id="{77B9CE2C-5798-329F-454E-1E9DD5FEE246}"/>
-              </a:ext>
-            </a:extLst>
-          </p:cNvPr>
-          <p:cNvSpPr>
-            <a:spLocks noGrp="1"/>
-          </p:cNvSpPr>
-          <p:nvPr>
-            <p:ph type="title"/>
-          </p:nvPr>
-        </p:nvSpPr>
-        <p:spPr/>
-        <p:txBody>
-          <a:bodyPr/>
-          <a:lstStyle/>
-          <a:p>
-            <a:r>
-              <a:rPr lang="en-US" kern="100" dirty="0">
-                <a:effectLst/>
-                <a:latin typeface="Calibri" panose="020F0502020204030204" pitchFamily="34" charset="0"/>
-                <a:ea typeface="Calibri" panose="020F0502020204030204" pitchFamily="34" charset="0"/>
-                <a:cs typeface="Times New Roman" panose="02020603050405020304" pitchFamily="18" charset="0"/>
-              </a:rPr>
-              <a:t>Price</a:t>
-            </a:r>
-            <a:r>
-              <a:rPr lang="en-US" sz="4000" kern="100" dirty="0">
-                <a:effectLst/>
-                <a:latin typeface="Calibri" panose="020F0502020204030204" pitchFamily="34" charset="0"/>
-                <a:ea typeface="Calibri" panose="020F0502020204030204" pitchFamily="34" charset="0"/>
-                <a:cs typeface="Times New Roman" panose="02020603050405020304" pitchFamily="18" charset="0"/>
-              </a:rPr>
-              <a:t> </a:t>
-            </a:r>
-            <a:r>
-              <a:rPr lang="en-US" kern="100" dirty="0">
-                <a:effectLst/>
-                <a:latin typeface="Calibri" panose="020F0502020204030204" pitchFamily="34" charset="0"/>
-                <a:ea typeface="Calibri" panose="020F0502020204030204" pitchFamily="34" charset="0"/>
-                <a:cs typeface="Times New Roman" panose="02020603050405020304" pitchFamily="18" charset="0"/>
-              </a:rPr>
-              <a:t>Analysis</a:t>
-            </a:r>
-            <a:br>
-              <a:rPr lang="en-US" kern="100" dirty="0">
-                <a:effectLst/>
-                <a:latin typeface="Calibri" panose="020F0502020204030204" pitchFamily="34" charset="0"/>
-                <a:ea typeface="Calibri" panose="020F0502020204030204" pitchFamily="34" charset="0"/>
-                <a:cs typeface="Times New Roman" panose="02020603050405020304" pitchFamily="18" charset="0"/>
-              </a:rPr>
-            </a:br>
-            <a:r>
-              <a:rPr lang="en-US" sz="2400" kern="100" dirty="0">
-                <a:latin typeface="Calibri" panose="020F0502020204030204" pitchFamily="34" charset="0"/>
-                <a:ea typeface="Calibri" panose="020F0502020204030204" pitchFamily="34" charset="0"/>
-                <a:cs typeface="Times New Roman" panose="02020603050405020304" pitchFamily="18" charset="0"/>
-              </a:rPr>
-              <a:t>Per Month</a:t>
-            </a:r>
-            <a:br>
-              <a:rPr lang="en-US" sz="2400" kern="100" dirty="0">
-                <a:latin typeface="Calibri" panose="020F0502020204030204" pitchFamily="34" charset="0"/>
-                <a:ea typeface="Calibri" panose="020F0502020204030204" pitchFamily="34" charset="0"/>
-                <a:cs typeface="Times New Roman" panose="02020603050405020304" pitchFamily="18" charset="0"/>
-              </a:rPr>
-            </a:br>
-            <a:endParaRPr lang="en-US" dirty="0"/>
-          </a:p>
-        </p:txBody>
-      </p:sp>
-      <p:pic>
-        <p:nvPicPr>
-          <p:cNvPr id="6" name="Content Placeholder 5">
-            <a:extLst>
-              <a:ext uri="{FF2B5EF4-FFF2-40B4-BE49-F238E27FC236}">
-                <a16:creationId xmlns:a16="http://schemas.microsoft.com/office/drawing/2014/main" id="{1DE769E9-DA4F-D888-E705-2A6D5136C898}"/>
-              </a:ext>
-            </a:extLst>
-          </p:cNvPr>
-          <p:cNvPicPr>
-            <a:picLocks noGrp="1" noChangeAspect="1"/>
-          </p:cNvPicPr>
-          <p:nvPr>
-            <p:ph idx="1"/>
-          </p:nvPr>
-        </p:nvPicPr>
-        <p:blipFill rotWithShape="1">
-          <a:blip r:embed="rId2"/>
-          <a:srcRect l="15496" t="21608" r="11063" b="5366"/>
-          <a:stretch/>
-        </p:blipFill>
-        <p:spPr>
-          <a:xfrm>
-            <a:off x="646111" y="1640792"/>
-            <a:ext cx="7835160" cy="4382503"/>
-          </a:xfrm>
-        </p:spPr>
-      </p:pic>
-    </p:spTree>
-    <p:extLst>
-      <p:ext uri="{BB962C8B-B14F-4D97-AF65-F5344CB8AC3E}">
-        <p14:creationId xmlns:p14="http://schemas.microsoft.com/office/powerpoint/2010/main" val="2560716288"/>
       </p:ext>
     </p:extLst>
   </p:cSld>

</xml_diff>